<commit_message>
updated names, removed tutorial link for now
</commit_message>
<xml_diff>
--- a/Slides/Module 02 From Requirements to Code.pptx
+++ b/Slides/Module 02 From Requirements to Code.pptx
@@ -188,6 +188,9 @@
     <p:ext uri="{EFAFB233-063F-42B5-8137-9DF3F51BA10A}">
       <p15:sldGuideLst xmlns:p15="http://schemas.microsoft.com/office/powerpoint/2012/main"/>
     </p:ext>
+    <p:ext uri="{2D200454-40CA-4A62-9FC3-DE9A4176ACB9}">
+      <p15:notesGuideLst xmlns:p15="http://schemas.microsoft.com/office/powerpoint/2012/main"/>
+    </p:ext>
   </p:extLst>
 </p:presentation>
 </file>
@@ -202,6 +205,422 @@
 
 <file path=ppt/changesInfos/changesInfo1.xml><?xml version="1.0" encoding="utf-8"?>
 <pc:chgInfo xmlns:a="http://schemas.openxmlformats.org/drawingml/2006/main" xmlns:r="http://schemas.openxmlformats.org/officeDocument/2006/relationships" xmlns:ac="http://schemas.microsoft.com/office/drawing/2013/main/command" xmlns:pc="http://schemas.microsoft.com/office/powerpoint/2013/main/command">
+  <pc:docChgLst>
+    <pc:chgData name="Mitchell Wand" userId="de9b44c55c049659" providerId="LiveId" clId="{4F168BC0-254E-4B4A-ACD1-8B075CC6997B}"/>
+    <pc:docChg chg="custSel addSld delSld modSld modSection">
+      <pc:chgData name="Mitchell Wand" userId="de9b44c55c049659" providerId="LiveId" clId="{4F168BC0-254E-4B4A-ACD1-8B075CC6997B}" dt="2022-08-30T00:26:35.133" v="908" actId="6549"/>
+      <pc:docMkLst>
+        <pc:docMk/>
+      </pc:docMkLst>
+      <pc:sldChg chg="del">
+        <pc:chgData name="Mitchell Wand" userId="de9b44c55c049659" providerId="LiveId" clId="{4F168BC0-254E-4B4A-ACD1-8B075CC6997B}" dt="2022-08-30T00:25:08.809" v="905" actId="2696"/>
+        <pc:sldMkLst>
+          <pc:docMk/>
+          <pc:sldMk cId="1694982008" sldId="518"/>
+        </pc:sldMkLst>
+      </pc:sldChg>
+      <pc:sldChg chg="modSp mod">
+        <pc:chgData name="Mitchell Wand" userId="de9b44c55c049659" providerId="LiveId" clId="{4F168BC0-254E-4B4A-ACD1-8B075CC6997B}" dt="2022-08-29T23:48:46.488" v="3" actId="1076"/>
+        <pc:sldMkLst>
+          <pc:docMk/>
+          <pc:sldMk cId="2142082936" sldId="524"/>
+        </pc:sldMkLst>
+        <pc:spChg chg="mod">
+          <ac:chgData name="Mitchell Wand" userId="de9b44c55c049659" providerId="LiveId" clId="{4F168BC0-254E-4B4A-ACD1-8B075CC6997B}" dt="2022-08-29T23:48:46.488" v="3" actId="1076"/>
+          <ac:spMkLst>
+            <pc:docMk/>
+            <pc:sldMk cId="2142082936" sldId="524"/>
+            <ac:spMk id="20" creationId="{D32B26A9-C6E4-11A1-6B73-F0E7FA408D77}"/>
+          </ac:spMkLst>
+        </pc:spChg>
+        <pc:spChg chg="mod">
+          <ac:chgData name="Mitchell Wand" userId="de9b44c55c049659" providerId="LiveId" clId="{4F168BC0-254E-4B4A-ACD1-8B075CC6997B}" dt="2022-08-29T23:48:07.063" v="0" actId="554"/>
+          <ac:spMkLst>
+            <pc:docMk/>
+            <pc:sldMk cId="2142082936" sldId="524"/>
+            <ac:spMk id="21" creationId="{6CF70320-05F8-5D16-EE20-37B44B179088}"/>
+          </ac:spMkLst>
+        </pc:spChg>
+        <pc:spChg chg="mod">
+          <ac:chgData name="Mitchell Wand" userId="de9b44c55c049659" providerId="LiveId" clId="{4F168BC0-254E-4B4A-ACD1-8B075CC6997B}" dt="2022-08-29T23:48:07.063" v="0" actId="554"/>
+          <ac:spMkLst>
+            <pc:docMk/>
+            <pc:sldMk cId="2142082936" sldId="524"/>
+            <ac:spMk id="22" creationId="{65700E32-BDD7-C9F3-AFEB-53F64DED82D0}"/>
+          </ac:spMkLst>
+        </pc:spChg>
+      </pc:sldChg>
+      <pc:sldChg chg="modSp mod">
+        <pc:chgData name="Mitchell Wand" userId="de9b44c55c049659" providerId="LiveId" clId="{4F168BC0-254E-4B4A-ACD1-8B075CC6997B}" dt="2022-08-29T23:49:41.503" v="30" actId="20577"/>
+        <pc:sldMkLst>
+          <pc:docMk/>
+          <pc:sldMk cId="1528585087" sldId="529"/>
+        </pc:sldMkLst>
+        <pc:spChg chg="mod">
+          <ac:chgData name="Mitchell Wand" userId="de9b44c55c049659" providerId="LiveId" clId="{4F168BC0-254E-4B4A-ACD1-8B075CC6997B}" dt="2022-08-29T23:49:41.503" v="30" actId="20577"/>
+          <ac:spMkLst>
+            <pc:docMk/>
+            <pc:sldMk cId="1528585087" sldId="529"/>
+            <ac:spMk id="5" creationId="{CA09847E-8340-DEF9-AB98-A0581C9005C3}"/>
+          </ac:spMkLst>
+        </pc:spChg>
+      </pc:sldChg>
+      <pc:sldChg chg="modSp mod">
+        <pc:chgData name="Mitchell Wand" userId="de9b44c55c049659" providerId="LiveId" clId="{4F168BC0-254E-4B4A-ACD1-8B075CC6997B}" dt="2022-08-29T23:51:43.940" v="33" actId="1076"/>
+        <pc:sldMkLst>
+          <pc:docMk/>
+          <pc:sldMk cId="3248119391" sldId="530"/>
+        </pc:sldMkLst>
+        <pc:spChg chg="mod">
+          <ac:chgData name="Mitchell Wand" userId="de9b44c55c049659" providerId="LiveId" clId="{4F168BC0-254E-4B4A-ACD1-8B075CC6997B}" dt="2022-08-29T23:51:43.940" v="33" actId="1076"/>
+          <ac:spMkLst>
+            <pc:docMk/>
+            <pc:sldMk cId="3248119391" sldId="530"/>
+            <ac:spMk id="7" creationId="{46754642-7BCE-A832-FB80-FB8ADF73088B}"/>
+          </ac:spMkLst>
+        </pc:spChg>
+      </pc:sldChg>
+      <pc:sldChg chg="addSp delSp modSp mod">
+        <pc:chgData name="Mitchell Wand" userId="de9b44c55c049659" providerId="LiveId" clId="{4F168BC0-254E-4B4A-ACD1-8B075CC6997B}" dt="2022-08-29T23:57:08.377" v="41" actId="1076"/>
+        <pc:sldMkLst>
+          <pc:docMk/>
+          <pc:sldMk cId="180694382" sldId="532"/>
+        </pc:sldMkLst>
+        <pc:spChg chg="add mod">
+          <ac:chgData name="Mitchell Wand" userId="de9b44c55c049659" providerId="LiveId" clId="{4F168BC0-254E-4B4A-ACD1-8B075CC6997B}" dt="2022-08-29T23:57:08.377" v="41" actId="1076"/>
+          <ac:spMkLst>
+            <pc:docMk/>
+            <pc:sldMk cId="180694382" sldId="532"/>
+            <ac:spMk id="2" creationId="{B5A47189-CBE5-11ED-A73D-CE02572B56D4}"/>
+          </ac:spMkLst>
+        </pc:spChg>
+        <pc:spChg chg="del ord">
+          <ac:chgData name="Mitchell Wand" userId="de9b44c55c049659" providerId="LiveId" clId="{4F168BC0-254E-4B4A-ACD1-8B075CC6997B}" dt="2022-08-29T23:57:01.355" v="40" actId="478"/>
+          <ac:spMkLst>
+            <pc:docMk/>
+            <pc:sldMk cId="180694382" sldId="532"/>
+            <ac:spMk id="7" creationId="{46754642-7BCE-A832-FB80-FB8ADF73088B}"/>
+          </ac:spMkLst>
+        </pc:spChg>
+      </pc:sldChg>
+      <pc:sldChg chg="modSp mod">
+        <pc:chgData name="Mitchell Wand" userId="de9b44c55c049659" providerId="LiveId" clId="{4F168BC0-254E-4B4A-ACD1-8B075CC6997B}" dt="2022-08-29T23:57:47.236" v="44" actId="1076"/>
+        <pc:sldMkLst>
+          <pc:docMk/>
+          <pc:sldMk cId="1401743332" sldId="533"/>
+        </pc:sldMkLst>
+        <pc:spChg chg="mod">
+          <ac:chgData name="Mitchell Wand" userId="de9b44c55c049659" providerId="LiveId" clId="{4F168BC0-254E-4B4A-ACD1-8B075CC6997B}" dt="2022-08-29T23:57:47.236" v="44" actId="1076"/>
+          <ac:spMkLst>
+            <pc:docMk/>
+            <pc:sldMk cId="1401743332" sldId="533"/>
+            <ac:spMk id="5" creationId="{2C073CC3-D3DD-8165-6091-A621177BDC7D}"/>
+          </ac:spMkLst>
+        </pc:spChg>
+      </pc:sldChg>
+      <pc:sldChg chg="delSp modSp mod">
+        <pc:chgData name="Mitchell Wand" userId="de9b44c55c049659" providerId="LiveId" clId="{4F168BC0-254E-4B4A-ACD1-8B075CC6997B}" dt="2022-08-29T23:59:29.506" v="88" actId="20577"/>
+        <pc:sldMkLst>
+          <pc:docMk/>
+          <pc:sldMk cId="2803174508" sldId="535"/>
+        </pc:sldMkLst>
+        <pc:spChg chg="mod">
+          <ac:chgData name="Mitchell Wand" userId="de9b44c55c049659" providerId="LiveId" clId="{4F168BC0-254E-4B4A-ACD1-8B075CC6997B}" dt="2022-08-29T23:58:58.937" v="86" actId="20577"/>
+          <ac:spMkLst>
+            <pc:docMk/>
+            <pc:sldMk cId="2803174508" sldId="535"/>
+            <ac:spMk id="2" creationId="{5165C75A-512B-9DBD-4A11-0E3C8CC6388F}"/>
+          </ac:spMkLst>
+        </pc:spChg>
+        <pc:spChg chg="del">
+          <ac:chgData name="Mitchell Wand" userId="de9b44c55c049659" providerId="LiveId" clId="{4F168BC0-254E-4B4A-ACD1-8B075CC6997B}" dt="2022-08-29T23:59:25.674" v="87" actId="478"/>
+          <ac:spMkLst>
+            <pc:docMk/>
+            <pc:sldMk cId="2803174508" sldId="535"/>
+            <ac:spMk id="3" creationId="{ADD0707B-80BE-2E2D-5054-3C8E235CCDFE}"/>
+          </ac:spMkLst>
+        </pc:spChg>
+        <pc:spChg chg="mod">
+          <ac:chgData name="Mitchell Wand" userId="de9b44c55c049659" providerId="LiveId" clId="{4F168BC0-254E-4B4A-ACD1-8B075CC6997B}" dt="2022-08-29T23:59:29.506" v="88" actId="20577"/>
+          <ac:spMkLst>
+            <pc:docMk/>
+            <pc:sldMk cId="2803174508" sldId="535"/>
+            <ac:spMk id="6" creationId="{42005B26-3FB6-33C5-C581-29BE3EDA4288}"/>
+          </ac:spMkLst>
+        </pc:spChg>
+      </pc:sldChg>
+      <pc:sldChg chg="modSp mod">
+        <pc:chgData name="Mitchell Wand" userId="de9b44c55c049659" providerId="LiveId" clId="{4F168BC0-254E-4B4A-ACD1-8B075CC6997B}" dt="2022-08-30T00:00:55.249" v="96" actId="20577"/>
+        <pc:sldMkLst>
+          <pc:docMk/>
+          <pc:sldMk cId="2403278414" sldId="538"/>
+        </pc:sldMkLst>
+        <pc:spChg chg="mod">
+          <ac:chgData name="Mitchell Wand" userId="de9b44c55c049659" providerId="LiveId" clId="{4F168BC0-254E-4B4A-ACD1-8B075CC6997B}" dt="2022-08-30T00:00:55.249" v="96" actId="20577"/>
+          <ac:spMkLst>
+            <pc:docMk/>
+            <pc:sldMk cId="2403278414" sldId="538"/>
+            <ac:spMk id="2" creationId="{591D3E0C-6DB3-A366-00C9-9208255B41E0}"/>
+          </ac:spMkLst>
+        </pc:spChg>
+        <pc:spChg chg="mod">
+          <ac:chgData name="Mitchell Wand" userId="de9b44c55c049659" providerId="LiveId" clId="{4F168BC0-254E-4B4A-ACD1-8B075CC6997B}" dt="2022-08-30T00:00:35.291" v="95" actId="14100"/>
+          <ac:spMkLst>
+            <pc:docMk/>
+            <pc:sldMk cId="2403278414" sldId="538"/>
+            <ac:spMk id="6" creationId="{2A600A8A-2D5E-81D5-CDA2-0F8D32C7F64C}"/>
+          </ac:spMkLst>
+        </pc:spChg>
+      </pc:sldChg>
+      <pc:sldChg chg="modSp mod">
+        <pc:chgData name="Mitchell Wand" userId="de9b44c55c049659" providerId="LiveId" clId="{4F168BC0-254E-4B4A-ACD1-8B075CC6997B}" dt="2022-08-30T00:01:16.785" v="99" actId="1076"/>
+        <pc:sldMkLst>
+          <pc:docMk/>
+          <pc:sldMk cId="1216486688" sldId="539"/>
+        </pc:sldMkLst>
+        <pc:spChg chg="mod">
+          <ac:chgData name="Mitchell Wand" userId="de9b44c55c049659" providerId="LiveId" clId="{4F168BC0-254E-4B4A-ACD1-8B075CC6997B}" dt="2022-08-30T00:01:00.459" v="97" actId="20577"/>
+          <ac:spMkLst>
+            <pc:docMk/>
+            <pc:sldMk cId="1216486688" sldId="539"/>
+            <ac:spMk id="2" creationId="{5D3050F9-1679-B42D-70EE-92EE12C88C74}"/>
+          </ac:spMkLst>
+        </pc:spChg>
+        <pc:spChg chg="mod">
+          <ac:chgData name="Mitchell Wand" userId="de9b44c55c049659" providerId="LiveId" clId="{4F168BC0-254E-4B4A-ACD1-8B075CC6997B}" dt="2022-08-30T00:01:16.785" v="99" actId="1076"/>
+          <ac:spMkLst>
+            <pc:docMk/>
+            <pc:sldMk cId="1216486688" sldId="539"/>
+            <ac:spMk id="6" creationId="{84C01FCE-A4F6-F143-92B0-A48B1E13C30A}"/>
+          </ac:spMkLst>
+        </pc:spChg>
+      </pc:sldChg>
+      <pc:sldChg chg="modSp mod">
+        <pc:chgData name="Mitchell Wand" userId="de9b44c55c049659" providerId="LiveId" clId="{4F168BC0-254E-4B4A-ACD1-8B075CC6997B}" dt="2022-08-30T00:01:30.607" v="100" actId="20577"/>
+        <pc:sldMkLst>
+          <pc:docMk/>
+          <pc:sldMk cId="1040918319" sldId="540"/>
+        </pc:sldMkLst>
+        <pc:spChg chg="mod">
+          <ac:chgData name="Mitchell Wand" userId="de9b44c55c049659" providerId="LiveId" clId="{4F168BC0-254E-4B4A-ACD1-8B075CC6997B}" dt="2022-08-30T00:01:30.607" v="100" actId="20577"/>
+          <ac:spMkLst>
+            <pc:docMk/>
+            <pc:sldMk cId="1040918319" sldId="540"/>
+            <ac:spMk id="2" creationId="{8EDB11B3-7246-B77B-3BAC-910946C071BD}"/>
+          </ac:spMkLst>
+        </pc:spChg>
+      </pc:sldChg>
+      <pc:sldChg chg="modSp mod">
+        <pc:chgData name="Mitchell Wand" userId="de9b44c55c049659" providerId="LiveId" clId="{4F168BC0-254E-4B4A-ACD1-8B075CC6997B}" dt="2022-08-30T00:01:41.343" v="101" actId="20577"/>
+        <pc:sldMkLst>
+          <pc:docMk/>
+          <pc:sldMk cId="729926477" sldId="541"/>
+        </pc:sldMkLst>
+        <pc:spChg chg="mod">
+          <ac:chgData name="Mitchell Wand" userId="de9b44c55c049659" providerId="LiveId" clId="{4F168BC0-254E-4B4A-ACD1-8B075CC6997B}" dt="2022-08-30T00:01:41.343" v="101" actId="20577"/>
+          <ac:spMkLst>
+            <pc:docMk/>
+            <pc:sldMk cId="729926477" sldId="541"/>
+            <ac:spMk id="2" creationId="{8EDB11B3-7246-B77B-3BAC-910946C071BD}"/>
+          </ac:spMkLst>
+        </pc:spChg>
+      </pc:sldChg>
+      <pc:sldChg chg="addSp delSp modSp mod modNotesTx">
+        <pc:chgData name="Mitchell Wand" userId="de9b44c55c049659" providerId="LiveId" clId="{4F168BC0-254E-4B4A-ACD1-8B075CC6997B}" dt="2022-08-30T00:07:21.616" v="298" actId="255"/>
+        <pc:sldMkLst>
+          <pc:docMk/>
+          <pc:sldMk cId="2977586155" sldId="542"/>
+        </pc:sldMkLst>
+        <pc:spChg chg="del">
+          <ac:chgData name="Mitchell Wand" userId="de9b44c55c049659" providerId="LiveId" clId="{4F168BC0-254E-4B4A-ACD1-8B075CC6997B}" dt="2022-08-30T00:03:08.567" v="104" actId="478"/>
+          <ac:spMkLst>
+            <pc:docMk/>
+            <pc:sldMk cId="2977586155" sldId="542"/>
+            <ac:spMk id="3" creationId="{1625FD5C-C08F-B3D9-D813-50A1024D0AB4}"/>
+          </ac:spMkLst>
+        </pc:spChg>
+        <pc:spChg chg="add mod">
+          <ac:chgData name="Mitchell Wand" userId="de9b44c55c049659" providerId="LiveId" clId="{4F168BC0-254E-4B4A-ACD1-8B075CC6997B}" dt="2022-08-30T00:07:21.616" v="298" actId="255"/>
+          <ac:spMkLst>
+            <pc:docMk/>
+            <pc:sldMk cId="2977586155" sldId="542"/>
+            <ac:spMk id="6" creationId="{C6BA028C-ACAA-66BD-C89D-AA4DB411C710}"/>
+          </ac:spMkLst>
+        </pc:spChg>
+      </pc:sldChg>
+      <pc:sldChg chg="addSp delSp modSp new mod modNotesTx">
+        <pc:chgData name="Mitchell Wand" userId="de9b44c55c049659" providerId="LiveId" clId="{4F168BC0-254E-4B4A-ACD1-8B075CC6997B}" dt="2022-08-30T00:10:24.502" v="346" actId="20577"/>
+        <pc:sldMkLst>
+          <pc:docMk/>
+          <pc:sldMk cId="1100294374" sldId="544"/>
+        </pc:sldMkLst>
+        <pc:spChg chg="mod">
+          <ac:chgData name="Mitchell Wand" userId="de9b44c55c049659" providerId="LiveId" clId="{4F168BC0-254E-4B4A-ACD1-8B075CC6997B}" dt="2022-08-30T00:06:09.029" v="290" actId="20577"/>
+          <ac:spMkLst>
+            <pc:docMk/>
+            <pc:sldMk cId="1100294374" sldId="544"/>
+            <ac:spMk id="2" creationId="{FD31471A-2D40-7646-0ED3-3FB302EF02B0}"/>
+          </ac:spMkLst>
+        </pc:spChg>
+        <pc:spChg chg="del">
+          <ac:chgData name="Mitchell Wand" userId="de9b44c55c049659" providerId="LiveId" clId="{4F168BC0-254E-4B4A-ACD1-8B075CC6997B}" dt="2022-08-30T00:06:01.630" v="282" actId="478"/>
+          <ac:spMkLst>
+            <pc:docMk/>
+            <pc:sldMk cId="1100294374" sldId="544"/>
+            <ac:spMk id="3" creationId="{AD5C8229-054B-F90E-F0B8-E330E0D161A6}"/>
+          </ac:spMkLst>
+        </pc:spChg>
+        <pc:spChg chg="add mod">
+          <ac:chgData name="Mitchell Wand" userId="de9b44c55c049659" providerId="LiveId" clId="{4F168BC0-254E-4B4A-ACD1-8B075CC6997B}" dt="2022-08-30T00:10:24.502" v="346" actId="20577"/>
+          <ac:spMkLst>
+            <pc:docMk/>
+            <pc:sldMk cId="1100294374" sldId="544"/>
+            <ac:spMk id="6" creationId="{FF22B922-145E-29BD-A99E-6AB5EB987C2D}"/>
+          </ac:spMkLst>
+        </pc:spChg>
+      </pc:sldChg>
+      <pc:sldChg chg="addSp delSp modSp new mod modNotesTx">
+        <pc:chgData name="Mitchell Wand" userId="de9b44c55c049659" providerId="LiveId" clId="{4F168BC0-254E-4B4A-ACD1-8B075CC6997B}" dt="2022-08-30T00:14:17.734" v="401" actId="20577"/>
+        <pc:sldMkLst>
+          <pc:docMk/>
+          <pc:sldMk cId="1601463616" sldId="545"/>
+        </pc:sldMkLst>
+        <pc:spChg chg="mod">
+          <ac:chgData name="Mitchell Wand" userId="de9b44c55c049659" providerId="LiveId" clId="{4F168BC0-254E-4B4A-ACD1-8B075CC6997B}" dt="2022-08-30T00:10:57.849" v="355" actId="20577"/>
+          <ac:spMkLst>
+            <pc:docMk/>
+            <pc:sldMk cId="1601463616" sldId="545"/>
+            <ac:spMk id="2" creationId="{21B4B1CC-7F35-8D56-B6E1-5B2596F672AB}"/>
+          </ac:spMkLst>
+        </pc:spChg>
+        <pc:spChg chg="del">
+          <ac:chgData name="Mitchell Wand" userId="de9b44c55c049659" providerId="LiveId" clId="{4F168BC0-254E-4B4A-ACD1-8B075CC6997B}" dt="2022-08-30T00:11:06.249" v="356" actId="478"/>
+          <ac:spMkLst>
+            <pc:docMk/>
+            <pc:sldMk cId="1601463616" sldId="545"/>
+            <ac:spMk id="3" creationId="{EA346AF5-A490-5AE0-E695-5E9C5D5CA1EE}"/>
+          </ac:spMkLst>
+        </pc:spChg>
+        <pc:spChg chg="add del mod">
+          <ac:chgData name="Mitchell Wand" userId="de9b44c55c049659" providerId="LiveId" clId="{4F168BC0-254E-4B4A-ACD1-8B075CC6997B}" dt="2022-08-30T00:12:09.275" v="364" actId="478"/>
+          <ac:spMkLst>
+            <pc:docMk/>
+            <pc:sldMk cId="1601463616" sldId="545"/>
+            <ac:spMk id="6" creationId="{C61F905B-0B01-401E-2859-8B566C31943D}"/>
+          </ac:spMkLst>
+        </pc:spChg>
+        <pc:spChg chg="add mod">
+          <ac:chgData name="Mitchell Wand" userId="de9b44c55c049659" providerId="LiveId" clId="{4F168BC0-254E-4B4A-ACD1-8B075CC6997B}" dt="2022-08-30T00:13:15.087" v="369" actId="14100"/>
+          <ac:spMkLst>
+            <pc:docMk/>
+            <pc:sldMk cId="1601463616" sldId="545"/>
+            <ac:spMk id="8" creationId="{E2C29B39-9408-CDC1-2CF2-1F368FF5CC54}"/>
+          </ac:spMkLst>
+        </pc:spChg>
+      </pc:sldChg>
+      <pc:sldChg chg="addSp delSp modSp new mod modClrScheme chgLayout">
+        <pc:chgData name="Mitchell Wand" userId="de9b44c55c049659" providerId="LiveId" clId="{4F168BC0-254E-4B4A-ACD1-8B075CC6997B}" dt="2022-08-30T00:24:35.207" v="904" actId="1076"/>
+        <pc:sldMkLst>
+          <pc:docMk/>
+          <pc:sldMk cId="1182532842" sldId="546"/>
+        </pc:sldMkLst>
+        <pc:spChg chg="del mod ord">
+          <ac:chgData name="Mitchell Wand" userId="de9b44c55c049659" providerId="LiveId" clId="{4F168BC0-254E-4B4A-ACD1-8B075CC6997B}" dt="2022-08-30T00:15:43.402" v="403" actId="700"/>
+          <ac:spMkLst>
+            <pc:docMk/>
+            <pc:sldMk cId="1182532842" sldId="546"/>
+            <ac:spMk id="2" creationId="{1BFCAD08-F873-3732-24C9-0A983C7F0690}"/>
+          </ac:spMkLst>
+        </pc:spChg>
+        <pc:spChg chg="del mod ord">
+          <ac:chgData name="Mitchell Wand" userId="de9b44c55c049659" providerId="LiveId" clId="{4F168BC0-254E-4B4A-ACD1-8B075CC6997B}" dt="2022-08-30T00:15:43.402" v="403" actId="700"/>
+          <ac:spMkLst>
+            <pc:docMk/>
+            <pc:sldMk cId="1182532842" sldId="546"/>
+            <ac:spMk id="3" creationId="{B42DCE12-100E-C67D-E4E8-A403DA6F196D}"/>
+          </ac:spMkLst>
+        </pc:spChg>
+        <pc:spChg chg="mod ord">
+          <ac:chgData name="Mitchell Wand" userId="de9b44c55c049659" providerId="LiveId" clId="{4F168BC0-254E-4B4A-ACD1-8B075CC6997B}" dt="2022-08-30T00:15:43.402" v="403" actId="700"/>
+          <ac:spMkLst>
+            <pc:docMk/>
+            <pc:sldMk cId="1182532842" sldId="546"/>
+            <ac:spMk id="4" creationId="{07DECDF5-6D84-590A-6104-C84BE2D78CEB}"/>
+          </ac:spMkLst>
+        </pc:spChg>
+        <pc:spChg chg="add mod ord">
+          <ac:chgData name="Mitchell Wand" userId="de9b44c55c049659" providerId="LiveId" clId="{4F168BC0-254E-4B4A-ACD1-8B075CC6997B}" dt="2022-08-30T00:15:51.988" v="415" actId="20577"/>
+          <ac:spMkLst>
+            <pc:docMk/>
+            <pc:sldMk cId="1182532842" sldId="546"/>
+            <ac:spMk id="5" creationId="{50A4A1A2-535C-6896-14A7-B0BE842D2869}"/>
+          </ac:spMkLst>
+        </pc:spChg>
+        <pc:spChg chg="add mod ord">
+          <ac:chgData name="Mitchell Wand" userId="de9b44c55c049659" providerId="LiveId" clId="{4F168BC0-254E-4B4A-ACD1-8B075CC6997B}" dt="2022-08-30T00:21:52.644" v="762" actId="20577"/>
+          <ac:spMkLst>
+            <pc:docMk/>
+            <pc:sldMk cId="1182532842" sldId="546"/>
+            <ac:spMk id="6" creationId="{7FBAE323-507C-EAA1-0948-EFF1D43CEBF2}"/>
+          </ac:spMkLst>
+        </pc:spChg>
+        <pc:spChg chg="add del mod">
+          <ac:chgData name="Mitchell Wand" userId="de9b44c55c049659" providerId="LiveId" clId="{4F168BC0-254E-4B4A-ACD1-8B075CC6997B}" dt="2022-08-30T00:19:44.751" v="529" actId="478"/>
+          <ac:spMkLst>
+            <pc:docMk/>
+            <pc:sldMk cId="1182532842" sldId="546"/>
+            <ac:spMk id="8" creationId="{3E9C16F3-7819-FB0E-2F56-E0CD2B51BEC4}"/>
+          </ac:spMkLst>
+        </pc:spChg>
+        <pc:spChg chg="add mod">
+          <ac:chgData name="Mitchell Wand" userId="de9b44c55c049659" providerId="LiveId" clId="{4F168BC0-254E-4B4A-ACD1-8B075CC6997B}" dt="2022-08-30T00:24:35.207" v="904" actId="1076"/>
+          <ac:spMkLst>
+            <pc:docMk/>
+            <pc:sldMk cId="1182532842" sldId="546"/>
+            <ac:spMk id="9" creationId="{64C4D745-2278-A166-4661-2A878B15AA61}"/>
+          </ac:spMkLst>
+        </pc:spChg>
+        <pc:spChg chg="add mod">
+          <ac:chgData name="Mitchell Wand" userId="de9b44c55c049659" providerId="LiveId" clId="{4F168BC0-254E-4B4A-ACD1-8B075CC6997B}" dt="2022-08-30T00:23:50.889" v="899" actId="1582"/>
+          <ac:spMkLst>
+            <pc:docMk/>
+            <pc:sldMk cId="1182532842" sldId="546"/>
+            <ac:spMk id="10" creationId="{DC4DB668-7EA5-4C1B-24DE-951EDEB0A65B}"/>
+          </ac:spMkLst>
+        </pc:spChg>
+        <pc:spChg chg="add mod">
+          <ac:chgData name="Mitchell Wand" userId="de9b44c55c049659" providerId="LiveId" clId="{4F168BC0-254E-4B4A-ACD1-8B075CC6997B}" dt="2022-08-30T00:24:10.574" v="901" actId="571"/>
+          <ac:spMkLst>
+            <pc:docMk/>
+            <pc:sldMk cId="1182532842" sldId="546"/>
+            <ac:spMk id="11" creationId="{01FEF201-A152-714B-CF27-E0B4FBD59C50}"/>
+          </ac:spMkLst>
+        </pc:spChg>
+        <pc:spChg chg="add mod">
+          <ac:chgData name="Mitchell Wand" userId="de9b44c55c049659" providerId="LiveId" clId="{4F168BC0-254E-4B4A-ACD1-8B075CC6997B}" dt="2022-08-30T00:24:23.026" v="903" actId="571"/>
+          <ac:spMkLst>
+            <pc:docMk/>
+            <pc:sldMk cId="1182532842" sldId="546"/>
+            <ac:spMk id="12" creationId="{5E3369B4-A629-E378-EF19-912B56BDF936}"/>
+          </ac:spMkLst>
+        </pc:spChg>
+      </pc:sldChg>
+      <pc:sldChg chg="add">
+        <pc:chgData name="Mitchell Wand" userId="de9b44c55c049659" providerId="LiveId" clId="{4F168BC0-254E-4B4A-ACD1-8B075CC6997B}" dt="2022-08-30T00:25:30.768" v="906"/>
+        <pc:sldMkLst>
+          <pc:docMk/>
+          <pc:sldMk cId="2850543431" sldId="547"/>
+        </pc:sldMkLst>
+      </pc:sldChg>
+      <pc:sldChg chg="add modNotesTx">
+        <pc:chgData name="Mitchell Wand" userId="de9b44c55c049659" providerId="LiveId" clId="{4F168BC0-254E-4B4A-ACD1-8B075CC6997B}" dt="2022-08-30T00:26:35.133" v="908" actId="6549"/>
+        <pc:sldMkLst>
+          <pc:docMk/>
+          <pc:sldMk cId="4225176879" sldId="548"/>
+        </pc:sldMkLst>
+      </pc:sldChg>
+    </pc:docChg>
+  </pc:docChgLst>
   <pc:docChgLst>
     <pc:chgData name="Mitchell Wand" userId="de9b44c55c049659" providerId="LiveId" clId="{2C6DC1C5-D47F-4A51-8D8C-965E79DFF076}"/>
     <pc:docChg chg="modSld">
@@ -236,6 +655,30 @@
             <pc:docMk/>
             <pc:sldMk cId="2803174508" sldId="535"/>
             <ac:spMk id="2" creationId="{5165C75A-512B-9DBD-4A11-0E3C8CC6388F}"/>
+          </ac:spMkLst>
+        </pc:spChg>
+      </pc:sldChg>
+    </pc:docChg>
+  </pc:docChgLst>
+  <pc:docChgLst>
+    <pc:chgData name="Mitchell Wand" userId="de9b44c55c049659" providerId="LiveId" clId="{5E9B31D5-84C8-4FD0-89F3-A47414AEAABB}"/>
+    <pc:docChg chg="modSld">
+      <pc:chgData name="Mitchell Wand" userId="de9b44c55c049659" providerId="LiveId" clId="{5E9B31D5-84C8-4FD0-89F3-A47414AEAABB}" dt="2022-09-09T00:44:55.339" v="7" actId="6549"/>
+      <pc:docMkLst>
+        <pc:docMk/>
+      </pc:docMkLst>
+      <pc:sldChg chg="modSp mod">
+        <pc:chgData name="Mitchell Wand" userId="de9b44c55c049659" providerId="LiveId" clId="{5E9B31D5-84C8-4FD0-89F3-A47414AEAABB}" dt="2022-09-09T00:44:55.339" v="7" actId="6549"/>
+        <pc:sldMkLst>
+          <pc:docMk/>
+          <pc:sldMk cId="1528585087" sldId="529"/>
+        </pc:sldMkLst>
+        <pc:spChg chg="mod">
+          <ac:chgData name="Mitchell Wand" userId="de9b44c55c049659" providerId="LiveId" clId="{5E9B31D5-84C8-4FD0-89F3-A47414AEAABB}" dt="2022-09-09T00:44:55.339" v="7" actId="6549"/>
+          <ac:spMkLst>
+            <pc:docMk/>
+            <pc:sldMk cId="1528585087" sldId="529"/>
+            <ac:spMk id="8" creationId="{5950D317-9151-B479-C436-611829898FD4}"/>
           </ac:spMkLst>
         </pc:spChg>
       </pc:sldChg>
@@ -927,446 +1370,6 @@
     </pc:docChg>
   </pc:docChgLst>
   <pc:docChgLst>
-    <pc:chgData name="Mitchell Wand" userId="de9b44c55c049659" providerId="LiveId" clId="{ACA31533-D7E5-4647-92CA-20F092EE7CE8}"/>
-    <pc:docChg chg="modSld">
-      <pc:chgData name="Mitchell Wand" userId="de9b44c55c049659" providerId="LiveId" clId="{ACA31533-D7E5-4647-92CA-20F092EE7CE8}" dt="2022-08-31T01:50:01.528" v="0" actId="20577"/>
-      <pc:docMkLst>
-        <pc:docMk/>
-      </pc:docMkLst>
-      <pc:sldChg chg="modSp mod">
-        <pc:chgData name="Mitchell Wand" userId="de9b44c55c049659" providerId="LiveId" clId="{ACA31533-D7E5-4647-92CA-20F092EE7CE8}" dt="2022-08-31T01:50:01.528" v="0" actId="20577"/>
-        <pc:sldMkLst>
-          <pc:docMk/>
-          <pc:sldMk cId="3025610200" sldId="485"/>
-        </pc:sldMkLst>
-        <pc:spChg chg="mod">
-          <ac:chgData name="Mitchell Wand" userId="de9b44c55c049659" providerId="LiveId" clId="{ACA31533-D7E5-4647-92CA-20F092EE7CE8}" dt="2022-08-31T01:50:01.528" v="0" actId="20577"/>
-          <ac:spMkLst>
-            <pc:docMk/>
-            <pc:sldMk cId="3025610200" sldId="485"/>
-            <ac:spMk id="8" creationId="{5B356C44-32EB-4AC4-94B7-A86895491E70}"/>
-          </ac:spMkLst>
-        </pc:spChg>
-      </pc:sldChg>
-    </pc:docChg>
-  </pc:docChgLst>
-  <pc:docChgLst>
-    <pc:chgData name="Mitchell Wand" userId="de9b44c55c049659" providerId="LiveId" clId="{4F168BC0-254E-4B4A-ACD1-8B075CC6997B}"/>
-    <pc:docChg chg="custSel addSld delSld modSld modSection">
-      <pc:chgData name="Mitchell Wand" userId="de9b44c55c049659" providerId="LiveId" clId="{4F168BC0-254E-4B4A-ACD1-8B075CC6997B}" dt="2022-08-30T00:26:35.133" v="908" actId="6549"/>
-      <pc:docMkLst>
-        <pc:docMk/>
-      </pc:docMkLst>
-      <pc:sldChg chg="del">
-        <pc:chgData name="Mitchell Wand" userId="de9b44c55c049659" providerId="LiveId" clId="{4F168BC0-254E-4B4A-ACD1-8B075CC6997B}" dt="2022-08-30T00:25:08.809" v="905" actId="2696"/>
-        <pc:sldMkLst>
-          <pc:docMk/>
-          <pc:sldMk cId="1694982008" sldId="518"/>
-        </pc:sldMkLst>
-      </pc:sldChg>
-      <pc:sldChg chg="modSp mod">
-        <pc:chgData name="Mitchell Wand" userId="de9b44c55c049659" providerId="LiveId" clId="{4F168BC0-254E-4B4A-ACD1-8B075CC6997B}" dt="2022-08-29T23:48:46.488" v="3" actId="1076"/>
-        <pc:sldMkLst>
-          <pc:docMk/>
-          <pc:sldMk cId="2142082936" sldId="524"/>
-        </pc:sldMkLst>
-        <pc:spChg chg="mod">
-          <ac:chgData name="Mitchell Wand" userId="de9b44c55c049659" providerId="LiveId" clId="{4F168BC0-254E-4B4A-ACD1-8B075CC6997B}" dt="2022-08-29T23:48:46.488" v="3" actId="1076"/>
-          <ac:spMkLst>
-            <pc:docMk/>
-            <pc:sldMk cId="2142082936" sldId="524"/>
-            <ac:spMk id="20" creationId="{D32B26A9-C6E4-11A1-6B73-F0E7FA408D77}"/>
-          </ac:spMkLst>
-        </pc:spChg>
-        <pc:spChg chg="mod">
-          <ac:chgData name="Mitchell Wand" userId="de9b44c55c049659" providerId="LiveId" clId="{4F168BC0-254E-4B4A-ACD1-8B075CC6997B}" dt="2022-08-29T23:48:07.063" v="0" actId="554"/>
-          <ac:spMkLst>
-            <pc:docMk/>
-            <pc:sldMk cId="2142082936" sldId="524"/>
-            <ac:spMk id="21" creationId="{6CF70320-05F8-5D16-EE20-37B44B179088}"/>
-          </ac:spMkLst>
-        </pc:spChg>
-        <pc:spChg chg="mod">
-          <ac:chgData name="Mitchell Wand" userId="de9b44c55c049659" providerId="LiveId" clId="{4F168BC0-254E-4B4A-ACD1-8B075CC6997B}" dt="2022-08-29T23:48:07.063" v="0" actId="554"/>
-          <ac:spMkLst>
-            <pc:docMk/>
-            <pc:sldMk cId="2142082936" sldId="524"/>
-            <ac:spMk id="22" creationId="{65700E32-BDD7-C9F3-AFEB-53F64DED82D0}"/>
-          </ac:spMkLst>
-        </pc:spChg>
-      </pc:sldChg>
-      <pc:sldChg chg="modSp mod">
-        <pc:chgData name="Mitchell Wand" userId="de9b44c55c049659" providerId="LiveId" clId="{4F168BC0-254E-4B4A-ACD1-8B075CC6997B}" dt="2022-08-29T23:49:41.503" v="30" actId="20577"/>
-        <pc:sldMkLst>
-          <pc:docMk/>
-          <pc:sldMk cId="1528585087" sldId="529"/>
-        </pc:sldMkLst>
-        <pc:spChg chg="mod">
-          <ac:chgData name="Mitchell Wand" userId="de9b44c55c049659" providerId="LiveId" clId="{4F168BC0-254E-4B4A-ACD1-8B075CC6997B}" dt="2022-08-29T23:49:41.503" v="30" actId="20577"/>
-          <ac:spMkLst>
-            <pc:docMk/>
-            <pc:sldMk cId="1528585087" sldId="529"/>
-            <ac:spMk id="5" creationId="{CA09847E-8340-DEF9-AB98-A0581C9005C3}"/>
-          </ac:spMkLst>
-        </pc:spChg>
-      </pc:sldChg>
-      <pc:sldChg chg="modSp mod">
-        <pc:chgData name="Mitchell Wand" userId="de9b44c55c049659" providerId="LiveId" clId="{4F168BC0-254E-4B4A-ACD1-8B075CC6997B}" dt="2022-08-29T23:51:43.940" v="33" actId="1076"/>
-        <pc:sldMkLst>
-          <pc:docMk/>
-          <pc:sldMk cId="3248119391" sldId="530"/>
-        </pc:sldMkLst>
-        <pc:spChg chg="mod">
-          <ac:chgData name="Mitchell Wand" userId="de9b44c55c049659" providerId="LiveId" clId="{4F168BC0-254E-4B4A-ACD1-8B075CC6997B}" dt="2022-08-29T23:51:43.940" v="33" actId="1076"/>
-          <ac:spMkLst>
-            <pc:docMk/>
-            <pc:sldMk cId="3248119391" sldId="530"/>
-            <ac:spMk id="7" creationId="{46754642-7BCE-A832-FB80-FB8ADF73088B}"/>
-          </ac:spMkLst>
-        </pc:spChg>
-      </pc:sldChg>
-      <pc:sldChg chg="addSp delSp modSp mod">
-        <pc:chgData name="Mitchell Wand" userId="de9b44c55c049659" providerId="LiveId" clId="{4F168BC0-254E-4B4A-ACD1-8B075CC6997B}" dt="2022-08-29T23:57:08.377" v="41" actId="1076"/>
-        <pc:sldMkLst>
-          <pc:docMk/>
-          <pc:sldMk cId="180694382" sldId="532"/>
-        </pc:sldMkLst>
-        <pc:spChg chg="add mod">
-          <ac:chgData name="Mitchell Wand" userId="de9b44c55c049659" providerId="LiveId" clId="{4F168BC0-254E-4B4A-ACD1-8B075CC6997B}" dt="2022-08-29T23:57:08.377" v="41" actId="1076"/>
-          <ac:spMkLst>
-            <pc:docMk/>
-            <pc:sldMk cId="180694382" sldId="532"/>
-            <ac:spMk id="2" creationId="{B5A47189-CBE5-11ED-A73D-CE02572B56D4}"/>
-          </ac:spMkLst>
-        </pc:spChg>
-        <pc:spChg chg="del ord">
-          <ac:chgData name="Mitchell Wand" userId="de9b44c55c049659" providerId="LiveId" clId="{4F168BC0-254E-4B4A-ACD1-8B075CC6997B}" dt="2022-08-29T23:57:01.355" v="40" actId="478"/>
-          <ac:spMkLst>
-            <pc:docMk/>
-            <pc:sldMk cId="180694382" sldId="532"/>
-            <ac:spMk id="7" creationId="{46754642-7BCE-A832-FB80-FB8ADF73088B}"/>
-          </ac:spMkLst>
-        </pc:spChg>
-      </pc:sldChg>
-      <pc:sldChg chg="modSp mod">
-        <pc:chgData name="Mitchell Wand" userId="de9b44c55c049659" providerId="LiveId" clId="{4F168BC0-254E-4B4A-ACD1-8B075CC6997B}" dt="2022-08-29T23:57:47.236" v="44" actId="1076"/>
-        <pc:sldMkLst>
-          <pc:docMk/>
-          <pc:sldMk cId="1401743332" sldId="533"/>
-        </pc:sldMkLst>
-        <pc:spChg chg="mod">
-          <ac:chgData name="Mitchell Wand" userId="de9b44c55c049659" providerId="LiveId" clId="{4F168BC0-254E-4B4A-ACD1-8B075CC6997B}" dt="2022-08-29T23:57:47.236" v="44" actId="1076"/>
-          <ac:spMkLst>
-            <pc:docMk/>
-            <pc:sldMk cId="1401743332" sldId="533"/>
-            <ac:spMk id="5" creationId="{2C073CC3-D3DD-8165-6091-A621177BDC7D}"/>
-          </ac:spMkLst>
-        </pc:spChg>
-      </pc:sldChg>
-      <pc:sldChg chg="delSp modSp mod">
-        <pc:chgData name="Mitchell Wand" userId="de9b44c55c049659" providerId="LiveId" clId="{4F168BC0-254E-4B4A-ACD1-8B075CC6997B}" dt="2022-08-29T23:59:29.506" v="88" actId="20577"/>
-        <pc:sldMkLst>
-          <pc:docMk/>
-          <pc:sldMk cId="2803174508" sldId="535"/>
-        </pc:sldMkLst>
-        <pc:spChg chg="mod">
-          <ac:chgData name="Mitchell Wand" userId="de9b44c55c049659" providerId="LiveId" clId="{4F168BC0-254E-4B4A-ACD1-8B075CC6997B}" dt="2022-08-29T23:58:58.937" v="86" actId="20577"/>
-          <ac:spMkLst>
-            <pc:docMk/>
-            <pc:sldMk cId="2803174508" sldId="535"/>
-            <ac:spMk id="2" creationId="{5165C75A-512B-9DBD-4A11-0E3C8CC6388F}"/>
-          </ac:spMkLst>
-        </pc:spChg>
-        <pc:spChg chg="del">
-          <ac:chgData name="Mitchell Wand" userId="de9b44c55c049659" providerId="LiveId" clId="{4F168BC0-254E-4B4A-ACD1-8B075CC6997B}" dt="2022-08-29T23:59:25.674" v="87" actId="478"/>
-          <ac:spMkLst>
-            <pc:docMk/>
-            <pc:sldMk cId="2803174508" sldId="535"/>
-            <ac:spMk id="3" creationId="{ADD0707B-80BE-2E2D-5054-3C8E235CCDFE}"/>
-          </ac:spMkLst>
-        </pc:spChg>
-        <pc:spChg chg="mod">
-          <ac:chgData name="Mitchell Wand" userId="de9b44c55c049659" providerId="LiveId" clId="{4F168BC0-254E-4B4A-ACD1-8B075CC6997B}" dt="2022-08-29T23:59:29.506" v="88" actId="20577"/>
-          <ac:spMkLst>
-            <pc:docMk/>
-            <pc:sldMk cId="2803174508" sldId="535"/>
-            <ac:spMk id="6" creationId="{42005B26-3FB6-33C5-C581-29BE3EDA4288}"/>
-          </ac:spMkLst>
-        </pc:spChg>
-      </pc:sldChg>
-      <pc:sldChg chg="modSp mod">
-        <pc:chgData name="Mitchell Wand" userId="de9b44c55c049659" providerId="LiveId" clId="{4F168BC0-254E-4B4A-ACD1-8B075CC6997B}" dt="2022-08-30T00:00:55.249" v="96" actId="20577"/>
-        <pc:sldMkLst>
-          <pc:docMk/>
-          <pc:sldMk cId="2403278414" sldId="538"/>
-        </pc:sldMkLst>
-        <pc:spChg chg="mod">
-          <ac:chgData name="Mitchell Wand" userId="de9b44c55c049659" providerId="LiveId" clId="{4F168BC0-254E-4B4A-ACD1-8B075CC6997B}" dt="2022-08-30T00:00:55.249" v="96" actId="20577"/>
-          <ac:spMkLst>
-            <pc:docMk/>
-            <pc:sldMk cId="2403278414" sldId="538"/>
-            <ac:spMk id="2" creationId="{591D3E0C-6DB3-A366-00C9-9208255B41E0}"/>
-          </ac:spMkLst>
-        </pc:spChg>
-        <pc:spChg chg="mod">
-          <ac:chgData name="Mitchell Wand" userId="de9b44c55c049659" providerId="LiveId" clId="{4F168BC0-254E-4B4A-ACD1-8B075CC6997B}" dt="2022-08-30T00:00:35.291" v="95" actId="14100"/>
-          <ac:spMkLst>
-            <pc:docMk/>
-            <pc:sldMk cId="2403278414" sldId="538"/>
-            <ac:spMk id="6" creationId="{2A600A8A-2D5E-81D5-CDA2-0F8D32C7F64C}"/>
-          </ac:spMkLst>
-        </pc:spChg>
-      </pc:sldChg>
-      <pc:sldChg chg="modSp mod">
-        <pc:chgData name="Mitchell Wand" userId="de9b44c55c049659" providerId="LiveId" clId="{4F168BC0-254E-4B4A-ACD1-8B075CC6997B}" dt="2022-08-30T00:01:16.785" v="99" actId="1076"/>
-        <pc:sldMkLst>
-          <pc:docMk/>
-          <pc:sldMk cId="1216486688" sldId="539"/>
-        </pc:sldMkLst>
-        <pc:spChg chg="mod">
-          <ac:chgData name="Mitchell Wand" userId="de9b44c55c049659" providerId="LiveId" clId="{4F168BC0-254E-4B4A-ACD1-8B075CC6997B}" dt="2022-08-30T00:01:00.459" v="97" actId="20577"/>
-          <ac:spMkLst>
-            <pc:docMk/>
-            <pc:sldMk cId="1216486688" sldId="539"/>
-            <ac:spMk id="2" creationId="{5D3050F9-1679-B42D-70EE-92EE12C88C74}"/>
-          </ac:spMkLst>
-        </pc:spChg>
-        <pc:spChg chg="mod">
-          <ac:chgData name="Mitchell Wand" userId="de9b44c55c049659" providerId="LiveId" clId="{4F168BC0-254E-4B4A-ACD1-8B075CC6997B}" dt="2022-08-30T00:01:16.785" v="99" actId="1076"/>
-          <ac:spMkLst>
-            <pc:docMk/>
-            <pc:sldMk cId="1216486688" sldId="539"/>
-            <ac:spMk id="6" creationId="{84C01FCE-A4F6-F143-92B0-A48B1E13C30A}"/>
-          </ac:spMkLst>
-        </pc:spChg>
-      </pc:sldChg>
-      <pc:sldChg chg="modSp mod">
-        <pc:chgData name="Mitchell Wand" userId="de9b44c55c049659" providerId="LiveId" clId="{4F168BC0-254E-4B4A-ACD1-8B075CC6997B}" dt="2022-08-30T00:01:30.607" v="100" actId="20577"/>
-        <pc:sldMkLst>
-          <pc:docMk/>
-          <pc:sldMk cId="1040918319" sldId="540"/>
-        </pc:sldMkLst>
-        <pc:spChg chg="mod">
-          <ac:chgData name="Mitchell Wand" userId="de9b44c55c049659" providerId="LiveId" clId="{4F168BC0-254E-4B4A-ACD1-8B075CC6997B}" dt="2022-08-30T00:01:30.607" v="100" actId="20577"/>
-          <ac:spMkLst>
-            <pc:docMk/>
-            <pc:sldMk cId="1040918319" sldId="540"/>
-            <ac:spMk id="2" creationId="{8EDB11B3-7246-B77B-3BAC-910946C071BD}"/>
-          </ac:spMkLst>
-        </pc:spChg>
-      </pc:sldChg>
-      <pc:sldChg chg="modSp mod">
-        <pc:chgData name="Mitchell Wand" userId="de9b44c55c049659" providerId="LiveId" clId="{4F168BC0-254E-4B4A-ACD1-8B075CC6997B}" dt="2022-08-30T00:01:41.343" v="101" actId="20577"/>
-        <pc:sldMkLst>
-          <pc:docMk/>
-          <pc:sldMk cId="729926477" sldId="541"/>
-        </pc:sldMkLst>
-        <pc:spChg chg="mod">
-          <ac:chgData name="Mitchell Wand" userId="de9b44c55c049659" providerId="LiveId" clId="{4F168BC0-254E-4B4A-ACD1-8B075CC6997B}" dt="2022-08-30T00:01:41.343" v="101" actId="20577"/>
-          <ac:spMkLst>
-            <pc:docMk/>
-            <pc:sldMk cId="729926477" sldId="541"/>
-            <ac:spMk id="2" creationId="{8EDB11B3-7246-B77B-3BAC-910946C071BD}"/>
-          </ac:spMkLst>
-        </pc:spChg>
-      </pc:sldChg>
-      <pc:sldChg chg="addSp delSp modSp mod modNotesTx">
-        <pc:chgData name="Mitchell Wand" userId="de9b44c55c049659" providerId="LiveId" clId="{4F168BC0-254E-4B4A-ACD1-8B075CC6997B}" dt="2022-08-30T00:07:21.616" v="298" actId="255"/>
-        <pc:sldMkLst>
-          <pc:docMk/>
-          <pc:sldMk cId="2977586155" sldId="542"/>
-        </pc:sldMkLst>
-        <pc:spChg chg="del">
-          <ac:chgData name="Mitchell Wand" userId="de9b44c55c049659" providerId="LiveId" clId="{4F168BC0-254E-4B4A-ACD1-8B075CC6997B}" dt="2022-08-30T00:03:08.567" v="104" actId="478"/>
-          <ac:spMkLst>
-            <pc:docMk/>
-            <pc:sldMk cId="2977586155" sldId="542"/>
-            <ac:spMk id="3" creationId="{1625FD5C-C08F-B3D9-D813-50A1024D0AB4}"/>
-          </ac:spMkLst>
-        </pc:spChg>
-        <pc:spChg chg="add mod">
-          <ac:chgData name="Mitchell Wand" userId="de9b44c55c049659" providerId="LiveId" clId="{4F168BC0-254E-4B4A-ACD1-8B075CC6997B}" dt="2022-08-30T00:07:21.616" v="298" actId="255"/>
-          <ac:spMkLst>
-            <pc:docMk/>
-            <pc:sldMk cId="2977586155" sldId="542"/>
-            <ac:spMk id="6" creationId="{C6BA028C-ACAA-66BD-C89D-AA4DB411C710}"/>
-          </ac:spMkLst>
-        </pc:spChg>
-      </pc:sldChg>
-      <pc:sldChg chg="addSp delSp modSp new mod modNotesTx">
-        <pc:chgData name="Mitchell Wand" userId="de9b44c55c049659" providerId="LiveId" clId="{4F168BC0-254E-4B4A-ACD1-8B075CC6997B}" dt="2022-08-30T00:10:24.502" v="346" actId="20577"/>
-        <pc:sldMkLst>
-          <pc:docMk/>
-          <pc:sldMk cId="1100294374" sldId="544"/>
-        </pc:sldMkLst>
-        <pc:spChg chg="mod">
-          <ac:chgData name="Mitchell Wand" userId="de9b44c55c049659" providerId="LiveId" clId="{4F168BC0-254E-4B4A-ACD1-8B075CC6997B}" dt="2022-08-30T00:06:09.029" v="290" actId="20577"/>
-          <ac:spMkLst>
-            <pc:docMk/>
-            <pc:sldMk cId="1100294374" sldId="544"/>
-            <ac:spMk id="2" creationId="{FD31471A-2D40-7646-0ED3-3FB302EF02B0}"/>
-          </ac:spMkLst>
-        </pc:spChg>
-        <pc:spChg chg="del">
-          <ac:chgData name="Mitchell Wand" userId="de9b44c55c049659" providerId="LiveId" clId="{4F168BC0-254E-4B4A-ACD1-8B075CC6997B}" dt="2022-08-30T00:06:01.630" v="282" actId="478"/>
-          <ac:spMkLst>
-            <pc:docMk/>
-            <pc:sldMk cId="1100294374" sldId="544"/>
-            <ac:spMk id="3" creationId="{AD5C8229-054B-F90E-F0B8-E330E0D161A6}"/>
-          </ac:spMkLst>
-        </pc:spChg>
-        <pc:spChg chg="add mod">
-          <ac:chgData name="Mitchell Wand" userId="de9b44c55c049659" providerId="LiveId" clId="{4F168BC0-254E-4B4A-ACD1-8B075CC6997B}" dt="2022-08-30T00:10:24.502" v="346" actId="20577"/>
-          <ac:spMkLst>
-            <pc:docMk/>
-            <pc:sldMk cId="1100294374" sldId="544"/>
-            <ac:spMk id="6" creationId="{FF22B922-145E-29BD-A99E-6AB5EB987C2D}"/>
-          </ac:spMkLst>
-        </pc:spChg>
-      </pc:sldChg>
-      <pc:sldChg chg="addSp delSp modSp new mod modNotesTx">
-        <pc:chgData name="Mitchell Wand" userId="de9b44c55c049659" providerId="LiveId" clId="{4F168BC0-254E-4B4A-ACD1-8B075CC6997B}" dt="2022-08-30T00:14:17.734" v="401" actId="20577"/>
-        <pc:sldMkLst>
-          <pc:docMk/>
-          <pc:sldMk cId="1601463616" sldId="545"/>
-        </pc:sldMkLst>
-        <pc:spChg chg="mod">
-          <ac:chgData name="Mitchell Wand" userId="de9b44c55c049659" providerId="LiveId" clId="{4F168BC0-254E-4B4A-ACD1-8B075CC6997B}" dt="2022-08-30T00:10:57.849" v="355" actId="20577"/>
-          <ac:spMkLst>
-            <pc:docMk/>
-            <pc:sldMk cId="1601463616" sldId="545"/>
-            <ac:spMk id="2" creationId="{21B4B1CC-7F35-8D56-B6E1-5B2596F672AB}"/>
-          </ac:spMkLst>
-        </pc:spChg>
-        <pc:spChg chg="del">
-          <ac:chgData name="Mitchell Wand" userId="de9b44c55c049659" providerId="LiveId" clId="{4F168BC0-254E-4B4A-ACD1-8B075CC6997B}" dt="2022-08-30T00:11:06.249" v="356" actId="478"/>
-          <ac:spMkLst>
-            <pc:docMk/>
-            <pc:sldMk cId="1601463616" sldId="545"/>
-            <ac:spMk id="3" creationId="{EA346AF5-A490-5AE0-E695-5E9C5D5CA1EE}"/>
-          </ac:spMkLst>
-        </pc:spChg>
-        <pc:spChg chg="add del mod">
-          <ac:chgData name="Mitchell Wand" userId="de9b44c55c049659" providerId="LiveId" clId="{4F168BC0-254E-4B4A-ACD1-8B075CC6997B}" dt="2022-08-30T00:12:09.275" v="364" actId="478"/>
-          <ac:spMkLst>
-            <pc:docMk/>
-            <pc:sldMk cId="1601463616" sldId="545"/>
-            <ac:spMk id="6" creationId="{C61F905B-0B01-401E-2859-8B566C31943D}"/>
-          </ac:spMkLst>
-        </pc:spChg>
-        <pc:spChg chg="add mod">
-          <ac:chgData name="Mitchell Wand" userId="de9b44c55c049659" providerId="LiveId" clId="{4F168BC0-254E-4B4A-ACD1-8B075CC6997B}" dt="2022-08-30T00:13:15.087" v="369" actId="14100"/>
-          <ac:spMkLst>
-            <pc:docMk/>
-            <pc:sldMk cId="1601463616" sldId="545"/>
-            <ac:spMk id="8" creationId="{E2C29B39-9408-CDC1-2CF2-1F368FF5CC54}"/>
-          </ac:spMkLst>
-        </pc:spChg>
-      </pc:sldChg>
-      <pc:sldChg chg="addSp delSp modSp new mod modClrScheme chgLayout">
-        <pc:chgData name="Mitchell Wand" userId="de9b44c55c049659" providerId="LiveId" clId="{4F168BC0-254E-4B4A-ACD1-8B075CC6997B}" dt="2022-08-30T00:24:35.207" v="904" actId="1076"/>
-        <pc:sldMkLst>
-          <pc:docMk/>
-          <pc:sldMk cId="1182532842" sldId="546"/>
-        </pc:sldMkLst>
-        <pc:spChg chg="del mod ord">
-          <ac:chgData name="Mitchell Wand" userId="de9b44c55c049659" providerId="LiveId" clId="{4F168BC0-254E-4B4A-ACD1-8B075CC6997B}" dt="2022-08-30T00:15:43.402" v="403" actId="700"/>
-          <ac:spMkLst>
-            <pc:docMk/>
-            <pc:sldMk cId="1182532842" sldId="546"/>
-            <ac:spMk id="2" creationId="{1BFCAD08-F873-3732-24C9-0A983C7F0690}"/>
-          </ac:spMkLst>
-        </pc:spChg>
-        <pc:spChg chg="del mod ord">
-          <ac:chgData name="Mitchell Wand" userId="de9b44c55c049659" providerId="LiveId" clId="{4F168BC0-254E-4B4A-ACD1-8B075CC6997B}" dt="2022-08-30T00:15:43.402" v="403" actId="700"/>
-          <ac:spMkLst>
-            <pc:docMk/>
-            <pc:sldMk cId="1182532842" sldId="546"/>
-            <ac:spMk id="3" creationId="{B42DCE12-100E-C67D-E4E8-A403DA6F196D}"/>
-          </ac:spMkLst>
-        </pc:spChg>
-        <pc:spChg chg="mod ord">
-          <ac:chgData name="Mitchell Wand" userId="de9b44c55c049659" providerId="LiveId" clId="{4F168BC0-254E-4B4A-ACD1-8B075CC6997B}" dt="2022-08-30T00:15:43.402" v="403" actId="700"/>
-          <ac:spMkLst>
-            <pc:docMk/>
-            <pc:sldMk cId="1182532842" sldId="546"/>
-            <ac:spMk id="4" creationId="{07DECDF5-6D84-590A-6104-C84BE2D78CEB}"/>
-          </ac:spMkLst>
-        </pc:spChg>
-        <pc:spChg chg="add mod ord">
-          <ac:chgData name="Mitchell Wand" userId="de9b44c55c049659" providerId="LiveId" clId="{4F168BC0-254E-4B4A-ACD1-8B075CC6997B}" dt="2022-08-30T00:15:51.988" v="415" actId="20577"/>
-          <ac:spMkLst>
-            <pc:docMk/>
-            <pc:sldMk cId="1182532842" sldId="546"/>
-            <ac:spMk id="5" creationId="{50A4A1A2-535C-6896-14A7-B0BE842D2869}"/>
-          </ac:spMkLst>
-        </pc:spChg>
-        <pc:spChg chg="add mod ord">
-          <ac:chgData name="Mitchell Wand" userId="de9b44c55c049659" providerId="LiveId" clId="{4F168BC0-254E-4B4A-ACD1-8B075CC6997B}" dt="2022-08-30T00:21:52.644" v="762" actId="20577"/>
-          <ac:spMkLst>
-            <pc:docMk/>
-            <pc:sldMk cId="1182532842" sldId="546"/>
-            <ac:spMk id="6" creationId="{7FBAE323-507C-EAA1-0948-EFF1D43CEBF2}"/>
-          </ac:spMkLst>
-        </pc:spChg>
-        <pc:spChg chg="add del mod">
-          <ac:chgData name="Mitchell Wand" userId="de9b44c55c049659" providerId="LiveId" clId="{4F168BC0-254E-4B4A-ACD1-8B075CC6997B}" dt="2022-08-30T00:19:44.751" v="529" actId="478"/>
-          <ac:spMkLst>
-            <pc:docMk/>
-            <pc:sldMk cId="1182532842" sldId="546"/>
-            <ac:spMk id="8" creationId="{3E9C16F3-7819-FB0E-2F56-E0CD2B51BEC4}"/>
-          </ac:spMkLst>
-        </pc:spChg>
-        <pc:spChg chg="add mod">
-          <ac:chgData name="Mitchell Wand" userId="de9b44c55c049659" providerId="LiveId" clId="{4F168BC0-254E-4B4A-ACD1-8B075CC6997B}" dt="2022-08-30T00:24:35.207" v="904" actId="1076"/>
-          <ac:spMkLst>
-            <pc:docMk/>
-            <pc:sldMk cId="1182532842" sldId="546"/>
-            <ac:spMk id="9" creationId="{64C4D745-2278-A166-4661-2A878B15AA61}"/>
-          </ac:spMkLst>
-        </pc:spChg>
-        <pc:spChg chg="add mod">
-          <ac:chgData name="Mitchell Wand" userId="de9b44c55c049659" providerId="LiveId" clId="{4F168BC0-254E-4B4A-ACD1-8B075CC6997B}" dt="2022-08-30T00:23:50.889" v="899" actId="1582"/>
-          <ac:spMkLst>
-            <pc:docMk/>
-            <pc:sldMk cId="1182532842" sldId="546"/>
-            <ac:spMk id="10" creationId="{DC4DB668-7EA5-4C1B-24DE-951EDEB0A65B}"/>
-          </ac:spMkLst>
-        </pc:spChg>
-        <pc:spChg chg="add mod">
-          <ac:chgData name="Mitchell Wand" userId="de9b44c55c049659" providerId="LiveId" clId="{4F168BC0-254E-4B4A-ACD1-8B075CC6997B}" dt="2022-08-30T00:24:10.574" v="901" actId="571"/>
-          <ac:spMkLst>
-            <pc:docMk/>
-            <pc:sldMk cId="1182532842" sldId="546"/>
-            <ac:spMk id="11" creationId="{01FEF201-A152-714B-CF27-E0B4FBD59C50}"/>
-          </ac:spMkLst>
-        </pc:spChg>
-        <pc:spChg chg="add mod">
-          <ac:chgData name="Mitchell Wand" userId="de9b44c55c049659" providerId="LiveId" clId="{4F168BC0-254E-4B4A-ACD1-8B075CC6997B}" dt="2022-08-30T00:24:23.026" v="903" actId="571"/>
-          <ac:spMkLst>
-            <pc:docMk/>
-            <pc:sldMk cId="1182532842" sldId="546"/>
-            <ac:spMk id="12" creationId="{5E3369B4-A629-E378-EF19-912B56BDF936}"/>
-          </ac:spMkLst>
-        </pc:spChg>
-      </pc:sldChg>
-      <pc:sldChg chg="add">
-        <pc:chgData name="Mitchell Wand" userId="de9b44c55c049659" providerId="LiveId" clId="{4F168BC0-254E-4B4A-ACD1-8B075CC6997B}" dt="2022-08-30T00:25:30.768" v="906"/>
-        <pc:sldMkLst>
-          <pc:docMk/>
-          <pc:sldMk cId="2850543431" sldId="547"/>
-        </pc:sldMkLst>
-      </pc:sldChg>
-      <pc:sldChg chg="add modNotesTx">
-        <pc:chgData name="Mitchell Wand" userId="de9b44c55c049659" providerId="LiveId" clId="{4F168BC0-254E-4B4A-ACD1-8B075CC6997B}" dt="2022-08-30T00:26:35.133" v="908" actId="6549"/>
-        <pc:sldMkLst>
-          <pc:docMk/>
-          <pc:sldMk cId="4225176879" sldId="548"/>
-        </pc:sldMkLst>
-      </pc:sldChg>
-    </pc:docChg>
-  </pc:docChgLst>
-  <pc:docChgLst>
     <pc:chgData name="Mitchell Wand" userId="de9b44c55c049659" providerId="LiveId" clId="{2CEF4DC6-0291-4031-B743-2034250D9D86}"/>
     <pc:docChg chg="undo custSel modSld">
       <pc:chgData name="Mitchell Wand" userId="de9b44c55c049659" providerId="LiveId" clId="{2CEF4DC6-0291-4031-B743-2034250D9D86}" dt="2024-08-13T20:46:45.494" v="620" actId="20577"/>
@@ -1425,24 +1428,24 @@
     </pc:docChg>
   </pc:docChgLst>
   <pc:docChgLst>
-    <pc:chgData name="Mitchell Wand" userId="de9b44c55c049659" providerId="LiveId" clId="{5E9B31D5-84C8-4FD0-89F3-A47414AEAABB}"/>
+    <pc:chgData name="Mitchell Wand" userId="de9b44c55c049659" providerId="LiveId" clId="{ACA31533-D7E5-4647-92CA-20F092EE7CE8}"/>
     <pc:docChg chg="modSld">
-      <pc:chgData name="Mitchell Wand" userId="de9b44c55c049659" providerId="LiveId" clId="{5E9B31D5-84C8-4FD0-89F3-A47414AEAABB}" dt="2022-09-09T00:44:55.339" v="7" actId="6549"/>
+      <pc:chgData name="Mitchell Wand" userId="de9b44c55c049659" providerId="LiveId" clId="{ACA31533-D7E5-4647-92CA-20F092EE7CE8}" dt="2022-08-31T01:50:01.528" v="0" actId="20577"/>
       <pc:docMkLst>
         <pc:docMk/>
       </pc:docMkLst>
       <pc:sldChg chg="modSp mod">
-        <pc:chgData name="Mitchell Wand" userId="de9b44c55c049659" providerId="LiveId" clId="{5E9B31D5-84C8-4FD0-89F3-A47414AEAABB}" dt="2022-09-09T00:44:55.339" v="7" actId="6549"/>
+        <pc:chgData name="Mitchell Wand" userId="de9b44c55c049659" providerId="LiveId" clId="{ACA31533-D7E5-4647-92CA-20F092EE7CE8}" dt="2022-08-31T01:50:01.528" v="0" actId="20577"/>
         <pc:sldMkLst>
           <pc:docMk/>
-          <pc:sldMk cId="1528585087" sldId="529"/>
+          <pc:sldMk cId="3025610200" sldId="485"/>
         </pc:sldMkLst>
         <pc:spChg chg="mod">
-          <ac:chgData name="Mitchell Wand" userId="de9b44c55c049659" providerId="LiveId" clId="{5E9B31D5-84C8-4FD0-89F3-A47414AEAABB}" dt="2022-09-09T00:44:55.339" v="7" actId="6549"/>
+          <ac:chgData name="Mitchell Wand" userId="de9b44c55c049659" providerId="LiveId" clId="{ACA31533-D7E5-4647-92CA-20F092EE7CE8}" dt="2022-08-31T01:50:01.528" v="0" actId="20577"/>
           <ac:spMkLst>
             <pc:docMk/>
-            <pc:sldMk cId="1528585087" sldId="529"/>
-            <ac:spMk id="8" creationId="{5950D317-9151-B479-C436-611829898FD4}"/>
+            <pc:sldMk cId="3025610200" sldId="485"/>
+            <ac:spMk id="8" creationId="{5B356C44-32EB-4AC4-94B7-A86895491E70}"/>
           </ac:spMkLst>
         </pc:spChg>
       </pc:sldChg>
@@ -1533,7 +1536,7 @@
           <a:p>
             <a:fld id="{7C7E5181-6CF5-45F7-A87A-E0E0B1FD7549}" type="datetimeFigureOut">
               <a:rPr lang="en-US" smtClean="0"/>
-              <a:t>8/13/2024</a:t>
+              <a:t>8/16/2024</a:t>
             </a:fld>
             <a:endParaRPr lang="en-US"/>
           </a:p>
@@ -4589,7 +4592,7 @@
           <a:p>
             <a:fld id="{5D2A64DE-480B-420F-9649-4F8E696E08E0}" type="datetime1">
               <a:rPr lang="en-US" smtClean="0"/>
-              <a:t>8/13/2024</a:t>
+              <a:t>8/16/2024</a:t>
             </a:fld>
             <a:endParaRPr lang="en-US"/>
           </a:p>
@@ -4913,7 +4916,7 @@
           <a:p>
             <a:fld id="{EA476A42-A091-4468-A075-64A31BE59948}" type="datetime1">
               <a:rPr lang="en-US" smtClean="0"/>
-              <a:t>8/13/2024</a:t>
+              <a:t>8/16/2024</a:t>
             </a:fld>
             <a:endParaRPr lang="en-US"/>
           </a:p>
@@ -5111,7 +5114,7 @@
           <a:p>
             <a:fld id="{0D3616D0-8311-4107-9726-6B805E7D05BA}" type="datetime1">
               <a:rPr lang="en-US" smtClean="0"/>
-              <a:t>8/13/2024</a:t>
+              <a:t>8/16/2024</a:t>
             </a:fld>
             <a:endParaRPr lang="en-US"/>
           </a:p>
@@ -5319,7 +5322,7 @@
           <a:p>
             <a:fld id="{3BC2557A-5C88-417A-A763-5AC779462A5F}" type="datetime1">
               <a:rPr lang="en-US" smtClean="0"/>
-              <a:t>8/13/2024</a:t>
+              <a:t>8/16/2024</a:t>
             </a:fld>
             <a:endParaRPr lang="en-US"/>
           </a:p>
@@ -5843,7 +5846,7 @@
           <a:p>
             <a:fld id="{07C7BFD4-467E-4EDE-93EA-052F5B39A4E5}" type="datetime1">
               <a:rPr lang="en-US" smtClean="0"/>
-              <a:t>8/13/2024</a:t>
+              <a:t>8/16/2024</a:t>
             </a:fld>
             <a:endParaRPr lang="en-US"/>
           </a:p>
@@ -6093,7 +6096,7 @@
           <a:p>
             <a:fld id="{07C7BFD4-467E-4EDE-93EA-052F5B39A4E5}" type="datetime1">
               <a:rPr lang="en-US" smtClean="0"/>
-              <a:t>8/13/2024</a:t>
+              <a:t>8/16/2024</a:t>
             </a:fld>
             <a:endParaRPr lang="en-US"/>
           </a:p>
@@ -6275,7 +6278,7 @@
           <a:p>
             <a:fld id="{109E55A0-C911-4F03-82FC-7E5926047D46}" type="datetime1">
               <a:rPr lang="en-US" smtClean="0"/>
-              <a:t>8/13/2024</a:t>
+              <a:t>8/16/2024</a:t>
             </a:fld>
             <a:endParaRPr lang="en-US"/>
           </a:p>
@@ -6588,7 +6591,7 @@
           <a:p>
             <a:fld id="{A533CBE2-D5BE-47AC-ADC2-9CDFC1D0CF90}" type="datetime1">
               <a:rPr lang="en-US" smtClean="0"/>
-              <a:t>8/13/2024</a:t>
+              <a:t>8/16/2024</a:t>
             </a:fld>
             <a:endParaRPr lang="en-US"/>
           </a:p>
@@ -6889,7 +6892,7 @@
           <a:p>
             <a:fld id="{39B7EDB1-CE74-4951-85A2-0B01C2128E28}" type="datetime1">
               <a:rPr lang="en-US" smtClean="0"/>
-              <a:t>8/13/2024</a:t>
+              <a:t>8/16/2024</a:t>
             </a:fld>
             <a:endParaRPr lang="en-US"/>
           </a:p>
@@ -7337,7 +7340,7 @@
           <a:p>
             <a:fld id="{2BC7EB92-A5C2-4807-A9DC-9EDE6CBFB241}" type="datetime1">
               <a:rPr lang="en-US" smtClean="0"/>
-              <a:t>8/13/2024</a:t>
+              <a:t>8/16/2024</a:t>
             </a:fld>
             <a:endParaRPr lang="en-US"/>
           </a:p>
@@ -7450,7 +7453,7 @@
           <a:p>
             <a:fld id="{2B7B7EE0-7771-4CD5-9B2B-3550753A54A1}" type="datetime1">
               <a:rPr lang="en-US" smtClean="0"/>
-              <a:t>8/13/2024</a:t>
+              <a:t>8/16/2024</a:t>
             </a:fld>
             <a:endParaRPr lang="en-US"/>
           </a:p>
@@ -7761,7 +7764,7 @@
           <a:p>
             <a:fld id="{F8B318B3-0E87-4416-A9B8-D891968C2727}" type="datetime1">
               <a:rPr lang="en-US" smtClean="0"/>
-              <a:t>8/13/2024</a:t>
+              <a:t>8/16/2024</a:t>
             </a:fld>
             <a:endParaRPr lang="en-US"/>
           </a:p>
@@ -8002,7 +8005,7 @@
           <a:p>
             <a:fld id="{54D997E8-DDEE-43F1-8D9B-F8A1E11DE488}" type="datetime1">
               <a:rPr lang="en-US" smtClean="0"/>
-              <a:t>8/13/2024</a:t>
+              <a:t>8/16/2024</a:t>
             </a:fld>
             <a:endParaRPr lang="en-US"/>
           </a:p>
@@ -8506,7 +8509,7 @@
             </a:pPr>
             <a:r>
               <a:rPr lang="en-US" sz="2400" dirty="0"/>
-              <a:t>Jon Bell, Adeel Bhutta and Mitch Wand</a:t>
+              <a:t>Adeel Bhutta and Mitch Wand</a:t>
             </a:r>
           </a:p>
           <a:p>

</xml_diff>